<commit_message>
updated readme and pptx
</commit_message>
<xml_diff>
--- a/Lazy Way To Performance.pptx
+++ b/Lazy Way To Performance.pptx
@@ -227,7 +227,7 @@
           <a:p>
             <a:fld id="{2ABDCA5D-8435-40B0-89EC-B7D7AAF0E892}" type="datetimeFigureOut">
               <a:rPr lang="en-US" smtClean="0"/>
-              <a:t>2/27/2020</a:t>
+              <a:t>3/3/2020</a:t>
             </a:fld>
             <a:endParaRPr lang="en-US" dirty="0"/>
           </a:p>
@@ -7861,6 +7861,133 @@
               <a:latin typeface="Segoe UI" pitchFamily="34" charset="0"/>
               <a:ea typeface="Segoe UI" pitchFamily="34" charset="0"/>
               <a:cs typeface="Segoe UI" pitchFamily="34" charset="0"/>
+            </a:endParaRPr>
+          </a:p>
+        </p:txBody>
+      </p:sp>
+      <p:sp>
+        <p:nvSpPr>
+          <p:cNvPr id="2" name="Rectangle 1">
+            <a:extLst>
+              <a:ext uri="{FF2B5EF4-FFF2-40B4-BE49-F238E27FC236}">
+                <a16:creationId xmlns:a16="http://schemas.microsoft.com/office/drawing/2014/main" id="{77739D2A-C95D-4B11-A663-C311308EA3DA}"/>
+              </a:ext>
+            </a:extLst>
+          </p:cNvPr>
+          <p:cNvSpPr/>
+          <p:nvPr/>
+        </p:nvSpPr>
+        <p:spPr>
+          <a:xfrm>
+            <a:off x="874450" y="864832"/>
+            <a:ext cx="6227685" cy="1384995"/>
+          </a:xfrm>
+          <a:prstGeom prst="rect">
+            <a:avLst/>
+          </a:prstGeom>
+        </p:spPr>
+        <p:txBody>
+          <a:bodyPr wrap="square">
+            <a:spAutoFit/>
+          </a:bodyPr>
+          <a:lstStyle/>
+          <a:p>
+            <a:pPr fontAlgn="base">
+              <a:lnSpc>
+                <a:spcPct val="100000"/>
+              </a:lnSpc>
+              <a:spcBef>
+                <a:spcPct val="0"/>
+              </a:spcBef>
+              <a:spcAft>
+                <a:spcPct val="0"/>
+              </a:spcAft>
+            </a:pPr>
+            <a:r>
+              <a:rPr lang="en-US" altLang="en-US" sz="3600" dirty="0">
+                <a:solidFill>
+                  <a:schemeClr val="bg1"/>
+                </a:solidFill>
+                <a:effectLst>
+                  <a:outerShdw blurRad="38100" dist="38100" dir="2700000" algn="tl">
+                    <a:srgbClr val="000000">
+                      <a:alpha val="43137"/>
+                    </a:srgbClr>
+                  </a:outerShdw>
+                </a:effectLst>
+                <a:latin typeface="Banda Regular" charset="0"/>
+              </a:rPr>
+              <a:t>Karen Baney</a:t>
+            </a:r>
+          </a:p>
+          <a:p>
+            <a:pPr fontAlgn="base">
+              <a:lnSpc>
+                <a:spcPct val="100000"/>
+              </a:lnSpc>
+              <a:spcBef>
+                <a:spcPct val="0"/>
+              </a:spcBef>
+              <a:spcAft>
+                <a:spcPct val="0"/>
+              </a:spcAft>
+            </a:pPr>
+            <a:r>
+              <a:rPr lang="en-US" altLang="en-US" sz="2400" dirty="0">
+                <a:solidFill>
+                  <a:schemeClr val="bg1"/>
+                </a:solidFill>
+                <a:effectLst>
+                  <a:outerShdw blurRad="38100" dist="38100" dir="2700000" algn="tl">
+                    <a:srgbClr val="000000">
+                      <a:alpha val="43137"/>
+                    </a:srgbClr>
+                  </a:outerShdw>
+                </a:effectLst>
+                <a:latin typeface="Banda Regular" charset="0"/>
+              </a:rPr>
+              <a:t>karen.baney@valorepartners.com</a:t>
+            </a:r>
+          </a:p>
+          <a:p>
+            <a:pPr fontAlgn="base">
+              <a:lnSpc>
+                <a:spcPct val="100000"/>
+              </a:lnSpc>
+              <a:spcBef>
+                <a:spcPct val="0"/>
+              </a:spcBef>
+              <a:spcAft>
+                <a:spcPct val="0"/>
+              </a:spcAft>
+            </a:pPr>
+            <a:r>
+              <a:rPr lang="en-US" sz="2400" dirty="0">
+                <a:solidFill>
+                  <a:schemeClr val="bg1"/>
+                </a:solidFill>
+                <a:hlinkClick r:id="rId3">
+                  <a:extLst>
+                    <a:ext uri="{A12FA001-AC4F-418D-AE19-62706E023703}">
+                      <ahyp:hlinkClr xmlns:ahyp="http://schemas.microsoft.com/office/drawing/2018/hyperlinkcolor" val="tx"/>
+                    </a:ext>
+                  </a:extLst>
+                </a:hlinkClick>
+              </a:rPr>
+              <a:t>https://github.com/kb-coder/lazydemo</a:t>
+            </a:r>
+            <a:endParaRPr lang="en-US" altLang="en-US" sz="2400" dirty="0">
+              <a:solidFill>
+                <a:schemeClr val="bg1"/>
+              </a:solidFill>
+              <a:effectLst>
+                <a:outerShdw blurRad="38100" dist="38100" dir="2700000" algn="tl">
+                  <a:srgbClr val="000000">
+                    <a:alpha val="43137"/>
+                  </a:srgbClr>
+                </a:outerShdw>
+              </a:effectLst>
+              <a:latin typeface="Banda Regular" charset="0"/>
             </a:endParaRPr>
           </a:p>
         </p:txBody>
@@ -10620,6 +10747,54 @@
 </file>
 
 <file path=customXml/item1.xml><?xml version="1.0" encoding="utf-8"?>
+<?mso-contentType ?>
+<FormTemplates xmlns="http://schemas.microsoft.com/sharepoint/v3/contenttype/forms">
+  <Display>DocumentLibraryForm</Display>
+  <Edit>DocumentLibraryForm</Edit>
+  <New>DocumentLibraryForm</New>
+</FormTemplates>
+</file>
+
+<file path=customXml/item2.xml><?xml version="1.0" encoding="utf-8"?>
+<p:properties xmlns:p="http://schemas.microsoft.com/office/2006/metadata/properties" xmlns:xsi="http://www.w3.org/2001/XMLSchema-instance" xmlns:pc="http://schemas.microsoft.com/office/infopath/2007/PartnerControls">
+  <documentManagement>
+    <_dlc_DocId xmlns="44fe81b0-5cc4-4eff-9771-d6fb78b117b2">VPDOC-2094075823-210</_dlc_DocId>
+    <_dlc_DocIdUrl xmlns="44fe81b0-5cc4-4eff-9771-d6fb78b117b2">
+      <Url>https://valorepartners.sharepoint.com/operations/sales/_layouts/15/DocIdRedir.aspx?ID=VPDOC-2094075823-210</Url>
+      <Description>VPDOC-2094075823-210</Description>
+    </_dlc_DocIdUrl>
+    <SharedWithUsers xmlns="68529c53-d4f5-4c89-b7df-303d2cf410e4">
+      <UserInfo>
+        <DisplayName>Bert Solano</DisplayName>
+        <AccountId>25</AccountId>
+        <AccountType/>
+      </UserInfo>
+      <UserInfo>
+        <DisplayName>Patrick McCarthy</DisplayName>
+        <AccountId>110</AccountId>
+        <AccountType/>
+      </UserInfo>
+      <UserInfo>
+        <DisplayName>Gary Willman</DisplayName>
+        <AccountId>107</AccountId>
+        <AccountType/>
+      </UserInfo>
+      <UserInfo>
+        <DisplayName>Jason Smith</DisplayName>
+        <AccountId>29</AccountId>
+        <AccountType/>
+      </UserInfo>
+      <UserInfo>
+        <DisplayName>Pete Miller</DisplayName>
+        <AccountId>28</AccountId>
+        <AccountType/>
+      </UserInfo>
+    </SharedWithUsers>
+  </documentManagement>
+</p:properties>
+</file>
+
+<file path=customXml/item3.xml><?xml version="1.0" encoding="utf-8"?>
 <ct:contentTypeSchema xmlns:ct="http://schemas.microsoft.com/office/2006/metadata/contentType" xmlns:ma="http://schemas.microsoft.com/office/2006/metadata/properties/metaAttributes" ct:_="" ma:_="" ma:contentTypeName="Document" ma:contentTypeID="0x01010046467CCB72D9CB4EACEAB239332C3CE6" ma:contentTypeVersion="12" ma:contentTypeDescription="Create a new document." ma:contentTypeScope="" ma:versionID="a67a3862fe7f84eb79e669e98d0edea4">
   <xsd:schema xmlns:xsd="http://www.w3.org/2001/XMLSchema" xmlns:xs="http://www.w3.org/2001/XMLSchema" xmlns:p="http://schemas.microsoft.com/office/2006/metadata/properties" xmlns:ns2="68529c53-d4f5-4c89-b7df-303d2cf410e4" xmlns:ns3="44fe81b0-5cc4-4eff-9771-d6fb78b117b2" targetNamespace="http://schemas.microsoft.com/office/2006/metadata/properties" ma:root="true" ma:fieldsID="bb2c5d5cb0f5a4b600e20870678f2d52" ns2:_="" ns3:_="">
     <xsd:import namespace="68529c53-d4f5-4c89-b7df-303d2cf410e4"/>
@@ -10803,54 +10978,6 @@
 </ct:contentTypeSchema>
 </file>
 
-<file path=customXml/item2.xml><?xml version="1.0" encoding="utf-8"?>
-<p:properties xmlns:p="http://schemas.microsoft.com/office/2006/metadata/properties" xmlns:xsi="http://www.w3.org/2001/XMLSchema-instance" xmlns:pc="http://schemas.microsoft.com/office/infopath/2007/PartnerControls">
-  <documentManagement>
-    <_dlc_DocId xmlns="44fe81b0-5cc4-4eff-9771-d6fb78b117b2">VPDOC-2094075823-210</_dlc_DocId>
-    <_dlc_DocIdUrl xmlns="44fe81b0-5cc4-4eff-9771-d6fb78b117b2">
-      <Url>https://valorepartners.sharepoint.com/operations/sales/_layouts/15/DocIdRedir.aspx?ID=VPDOC-2094075823-210</Url>
-      <Description>VPDOC-2094075823-210</Description>
-    </_dlc_DocIdUrl>
-    <SharedWithUsers xmlns="68529c53-d4f5-4c89-b7df-303d2cf410e4">
-      <UserInfo>
-        <DisplayName>Bert Solano</DisplayName>
-        <AccountId>25</AccountId>
-        <AccountType/>
-      </UserInfo>
-      <UserInfo>
-        <DisplayName>Patrick McCarthy</DisplayName>
-        <AccountId>110</AccountId>
-        <AccountType/>
-      </UserInfo>
-      <UserInfo>
-        <DisplayName>Gary Willman</DisplayName>
-        <AccountId>107</AccountId>
-        <AccountType/>
-      </UserInfo>
-      <UserInfo>
-        <DisplayName>Jason Smith</DisplayName>
-        <AccountId>29</AccountId>
-        <AccountType/>
-      </UserInfo>
-      <UserInfo>
-        <DisplayName>Pete Miller</DisplayName>
-        <AccountId>28</AccountId>
-        <AccountType/>
-      </UserInfo>
-    </SharedWithUsers>
-  </documentManagement>
-</p:properties>
-</file>
-
-<file path=customXml/item3.xml><?xml version="1.0" encoding="utf-8"?>
-<?mso-contentType ?>
-<FormTemplates xmlns="http://schemas.microsoft.com/sharepoint/v3/contenttype/forms">
-  <Display>DocumentLibraryForm</Display>
-  <Edit>DocumentLibraryForm</Edit>
-  <New>DocumentLibraryForm</New>
-</FormTemplates>
-</file>
-
 <file path=customXml/item4.xml><?xml version="1.0" encoding="utf-8"?>
 <?mso-contentType ?>
 <spe:Receivers xmlns:spe="http://schemas.microsoft.com/sharepoint/events">
@@ -10902,20 +11029,9 @@
 </file>
 
 <file path=customXml/itemProps1.xml><?xml version="1.0" encoding="utf-8"?>
-<ds:datastoreItem xmlns:ds="http://schemas.openxmlformats.org/officeDocument/2006/customXml" ds:itemID="{3CC849A4-28EB-4E35-A7B8-38E46F20B270}">
+<ds:datastoreItem xmlns:ds="http://schemas.openxmlformats.org/officeDocument/2006/customXml" ds:itemID="{D8BAE018-56F6-459D-83A1-5E0ED2D20635}">
   <ds:schemaRefs>
-    <ds:schemaRef ds:uri="http://schemas.microsoft.com/office/2006/metadata/contentType"/>
-    <ds:schemaRef ds:uri="http://schemas.microsoft.com/office/2006/metadata/properties/metaAttributes"/>
-    <ds:schemaRef ds:uri="http://www.w3.org/2001/XMLSchema"/>
-    <ds:schemaRef ds:uri="http://schemas.microsoft.com/office/2006/metadata/properties"/>
-    <ds:schemaRef ds:uri="68529c53-d4f5-4c89-b7df-303d2cf410e4"/>
-    <ds:schemaRef ds:uri="44fe81b0-5cc4-4eff-9771-d6fb78b117b2"/>
-    <ds:schemaRef ds:uri="http://schemas.microsoft.com/office/2006/documentManagement/types"/>
-    <ds:schemaRef ds:uri="http://schemas.microsoft.com/office/infopath/2007/PartnerControls"/>
-    <ds:schemaRef ds:uri="http://schemas.openxmlformats.org/package/2006/metadata/core-properties"/>
-    <ds:schemaRef ds:uri="http://purl.org/dc/elements/1.1/"/>
-    <ds:schemaRef ds:uri="http://purl.org/dc/terms/"/>
-    <ds:schemaRef ds:uri="http://schemas.microsoft.com/internal/obd"/>
+    <ds:schemaRef ds:uri="http://schemas.microsoft.com/sharepoint/v3/contenttype/forms"/>
   </ds:schemaRefs>
 </ds:datastoreItem>
 </file>
@@ -10938,9 +11054,20 @@
 </file>
 
 <file path=customXml/itemProps3.xml><?xml version="1.0" encoding="utf-8"?>
-<ds:datastoreItem xmlns:ds="http://schemas.openxmlformats.org/officeDocument/2006/customXml" ds:itemID="{D8BAE018-56F6-459D-83A1-5E0ED2D20635}">
+<ds:datastoreItem xmlns:ds="http://schemas.openxmlformats.org/officeDocument/2006/customXml" ds:itemID="{3CC849A4-28EB-4E35-A7B8-38E46F20B270}">
   <ds:schemaRefs>
-    <ds:schemaRef ds:uri="http://schemas.microsoft.com/sharepoint/v3/contenttype/forms"/>
+    <ds:schemaRef ds:uri="http://schemas.microsoft.com/office/2006/metadata/contentType"/>
+    <ds:schemaRef ds:uri="http://schemas.microsoft.com/office/2006/metadata/properties/metaAttributes"/>
+    <ds:schemaRef ds:uri="http://www.w3.org/2001/XMLSchema"/>
+    <ds:schemaRef ds:uri="http://schemas.microsoft.com/office/2006/metadata/properties"/>
+    <ds:schemaRef ds:uri="68529c53-d4f5-4c89-b7df-303d2cf410e4"/>
+    <ds:schemaRef ds:uri="44fe81b0-5cc4-4eff-9771-d6fb78b117b2"/>
+    <ds:schemaRef ds:uri="http://schemas.microsoft.com/office/2006/documentManagement/types"/>
+    <ds:schemaRef ds:uri="http://schemas.microsoft.com/office/infopath/2007/PartnerControls"/>
+    <ds:schemaRef ds:uri="http://schemas.openxmlformats.org/package/2006/metadata/core-properties"/>
+    <ds:schemaRef ds:uri="http://purl.org/dc/elements/1.1/"/>
+    <ds:schemaRef ds:uri="http://purl.org/dc/terms/"/>
+    <ds:schemaRef ds:uri="http://schemas.microsoft.com/internal/obd"/>
   </ds:schemaRefs>
 </ds:datastoreItem>
 </file>

</xml_diff>

<commit_message>
fix regex to include @vue in vue chunk
</commit_message>
<xml_diff>
--- a/Lazy Way To Performance.pptx
+++ b/Lazy Way To Performance.pptx
@@ -227,7 +227,7 @@
           <a:p>
             <a:fld id="{2ABDCA5D-8435-40B0-89EC-B7D7AAF0E892}" type="datetimeFigureOut">
               <a:rPr lang="en-US" smtClean="0"/>
-              <a:t>3/3/2020</a:t>
+              <a:t>3/4/2020</a:t>
             </a:fld>
             <a:endParaRPr lang="en-US" dirty="0"/>
           </a:p>
@@ -885,50 +885,7 @@
           <a:bodyPr wrap="none" anchor="t"/>
           <a:lstStyle/>
           <a:p>
-            <a:r>
-              <a:rPr lang="en-US" altLang="en-US" dirty="0"/>
-              <a:t>Introduction to </a:t>
-            </a:r>
-            <a:r>
-              <a:rPr lang="en-US" altLang="en-US" dirty="0" err="1"/>
-              <a:t>VueJS</a:t>
-            </a:r>
-            <a:r>
-              <a:rPr lang="en-US" altLang="en-US" dirty="0"/>
-              <a:t> 2</a:t>
-            </a:r>
-          </a:p>
-          <a:p>
             <a:endParaRPr lang="en-US" altLang="en-US" dirty="0"/>
-          </a:p>
-          <a:p>
-            <a:r>
-              <a:rPr lang="en-US" altLang="en-US" dirty="0"/>
-              <a:t>Valore Partners</a:t>
-            </a:r>
-          </a:p>
-          <a:p>
-            <a:r>
-              <a:rPr lang="en-US" altLang="en-US" dirty="0"/>
-              <a:t>Karen </a:t>
-            </a:r>
-            <a:r>
-              <a:rPr lang="en-US" altLang="en-US" dirty="0" err="1"/>
-              <a:t>Baney</a:t>
-            </a:r>
-            <a:endParaRPr lang="en-US" altLang="en-US" dirty="0"/>
-          </a:p>
-          <a:p>
-            <a:r>
-              <a:rPr lang="en-US" altLang="en-US" dirty="0"/>
-              <a:t>Senior Consultant</a:t>
-            </a:r>
-          </a:p>
-          <a:p>
-            <a:r>
-              <a:rPr lang="en-US" altLang="en-US" dirty="0"/>
-              <a:t>Karen.baney@valorepartners.com</a:t>
-            </a:r>
           </a:p>
         </p:txBody>
       </p:sp>
@@ -10747,54 +10704,6 @@
 </file>
 
 <file path=customXml/item1.xml><?xml version="1.0" encoding="utf-8"?>
-<?mso-contentType ?>
-<FormTemplates xmlns="http://schemas.microsoft.com/sharepoint/v3/contenttype/forms">
-  <Display>DocumentLibraryForm</Display>
-  <Edit>DocumentLibraryForm</Edit>
-  <New>DocumentLibraryForm</New>
-</FormTemplates>
-</file>
-
-<file path=customXml/item2.xml><?xml version="1.0" encoding="utf-8"?>
-<p:properties xmlns:p="http://schemas.microsoft.com/office/2006/metadata/properties" xmlns:xsi="http://www.w3.org/2001/XMLSchema-instance" xmlns:pc="http://schemas.microsoft.com/office/infopath/2007/PartnerControls">
-  <documentManagement>
-    <_dlc_DocId xmlns="44fe81b0-5cc4-4eff-9771-d6fb78b117b2">VPDOC-2094075823-210</_dlc_DocId>
-    <_dlc_DocIdUrl xmlns="44fe81b0-5cc4-4eff-9771-d6fb78b117b2">
-      <Url>https://valorepartners.sharepoint.com/operations/sales/_layouts/15/DocIdRedir.aspx?ID=VPDOC-2094075823-210</Url>
-      <Description>VPDOC-2094075823-210</Description>
-    </_dlc_DocIdUrl>
-    <SharedWithUsers xmlns="68529c53-d4f5-4c89-b7df-303d2cf410e4">
-      <UserInfo>
-        <DisplayName>Bert Solano</DisplayName>
-        <AccountId>25</AccountId>
-        <AccountType/>
-      </UserInfo>
-      <UserInfo>
-        <DisplayName>Patrick McCarthy</DisplayName>
-        <AccountId>110</AccountId>
-        <AccountType/>
-      </UserInfo>
-      <UserInfo>
-        <DisplayName>Gary Willman</DisplayName>
-        <AccountId>107</AccountId>
-        <AccountType/>
-      </UserInfo>
-      <UserInfo>
-        <DisplayName>Jason Smith</DisplayName>
-        <AccountId>29</AccountId>
-        <AccountType/>
-      </UserInfo>
-      <UserInfo>
-        <DisplayName>Pete Miller</DisplayName>
-        <AccountId>28</AccountId>
-        <AccountType/>
-      </UserInfo>
-    </SharedWithUsers>
-  </documentManagement>
-</p:properties>
-</file>
-
-<file path=customXml/item3.xml><?xml version="1.0" encoding="utf-8"?>
 <ct:contentTypeSchema xmlns:ct="http://schemas.microsoft.com/office/2006/metadata/contentType" xmlns:ma="http://schemas.microsoft.com/office/2006/metadata/properties/metaAttributes" ct:_="" ma:_="" ma:contentTypeName="Document" ma:contentTypeID="0x01010046467CCB72D9CB4EACEAB239332C3CE6" ma:contentTypeVersion="12" ma:contentTypeDescription="Create a new document." ma:contentTypeScope="" ma:versionID="a67a3862fe7f84eb79e669e98d0edea4">
   <xsd:schema xmlns:xsd="http://www.w3.org/2001/XMLSchema" xmlns:xs="http://www.w3.org/2001/XMLSchema" xmlns:p="http://schemas.microsoft.com/office/2006/metadata/properties" xmlns:ns2="68529c53-d4f5-4c89-b7df-303d2cf410e4" xmlns:ns3="44fe81b0-5cc4-4eff-9771-d6fb78b117b2" targetNamespace="http://schemas.microsoft.com/office/2006/metadata/properties" ma:root="true" ma:fieldsID="bb2c5d5cb0f5a4b600e20870678f2d52" ns2:_="" ns3:_="">
     <xsd:import namespace="68529c53-d4f5-4c89-b7df-303d2cf410e4"/>
@@ -10978,6 +10887,54 @@
 </ct:contentTypeSchema>
 </file>
 
+<file path=customXml/item2.xml><?xml version="1.0" encoding="utf-8"?>
+<p:properties xmlns:p="http://schemas.microsoft.com/office/2006/metadata/properties" xmlns:xsi="http://www.w3.org/2001/XMLSchema-instance" xmlns:pc="http://schemas.microsoft.com/office/infopath/2007/PartnerControls">
+  <documentManagement>
+    <_dlc_DocId xmlns="44fe81b0-5cc4-4eff-9771-d6fb78b117b2">VPDOC-2094075823-210</_dlc_DocId>
+    <_dlc_DocIdUrl xmlns="44fe81b0-5cc4-4eff-9771-d6fb78b117b2">
+      <Url>https://valorepartners.sharepoint.com/operations/sales/_layouts/15/DocIdRedir.aspx?ID=VPDOC-2094075823-210</Url>
+      <Description>VPDOC-2094075823-210</Description>
+    </_dlc_DocIdUrl>
+    <SharedWithUsers xmlns="68529c53-d4f5-4c89-b7df-303d2cf410e4">
+      <UserInfo>
+        <DisplayName>Bert Solano</DisplayName>
+        <AccountId>25</AccountId>
+        <AccountType/>
+      </UserInfo>
+      <UserInfo>
+        <DisplayName>Patrick McCarthy</DisplayName>
+        <AccountId>110</AccountId>
+        <AccountType/>
+      </UserInfo>
+      <UserInfo>
+        <DisplayName>Gary Willman</DisplayName>
+        <AccountId>107</AccountId>
+        <AccountType/>
+      </UserInfo>
+      <UserInfo>
+        <DisplayName>Jason Smith</DisplayName>
+        <AccountId>29</AccountId>
+        <AccountType/>
+      </UserInfo>
+      <UserInfo>
+        <DisplayName>Pete Miller</DisplayName>
+        <AccountId>28</AccountId>
+        <AccountType/>
+      </UserInfo>
+    </SharedWithUsers>
+  </documentManagement>
+</p:properties>
+</file>
+
+<file path=customXml/item3.xml><?xml version="1.0" encoding="utf-8"?>
+<?mso-contentType ?>
+<FormTemplates xmlns="http://schemas.microsoft.com/sharepoint/v3/contenttype/forms">
+  <Display>DocumentLibraryForm</Display>
+  <Edit>DocumentLibraryForm</Edit>
+  <New>DocumentLibraryForm</New>
+</FormTemplates>
+</file>
+
 <file path=customXml/item4.xml><?xml version="1.0" encoding="utf-8"?>
 <?mso-contentType ?>
 <spe:Receivers xmlns:spe="http://schemas.microsoft.com/sharepoint/events">
@@ -11029,9 +10986,20 @@
 </file>
 
 <file path=customXml/itemProps1.xml><?xml version="1.0" encoding="utf-8"?>
-<ds:datastoreItem xmlns:ds="http://schemas.openxmlformats.org/officeDocument/2006/customXml" ds:itemID="{D8BAE018-56F6-459D-83A1-5E0ED2D20635}">
+<ds:datastoreItem xmlns:ds="http://schemas.openxmlformats.org/officeDocument/2006/customXml" ds:itemID="{3CC849A4-28EB-4E35-A7B8-38E46F20B270}">
   <ds:schemaRefs>
-    <ds:schemaRef ds:uri="http://schemas.microsoft.com/sharepoint/v3/contenttype/forms"/>
+    <ds:schemaRef ds:uri="http://schemas.microsoft.com/office/2006/metadata/contentType"/>
+    <ds:schemaRef ds:uri="http://schemas.microsoft.com/office/2006/metadata/properties/metaAttributes"/>
+    <ds:schemaRef ds:uri="http://www.w3.org/2001/XMLSchema"/>
+    <ds:schemaRef ds:uri="http://schemas.microsoft.com/office/2006/metadata/properties"/>
+    <ds:schemaRef ds:uri="68529c53-d4f5-4c89-b7df-303d2cf410e4"/>
+    <ds:schemaRef ds:uri="44fe81b0-5cc4-4eff-9771-d6fb78b117b2"/>
+    <ds:schemaRef ds:uri="http://schemas.microsoft.com/office/2006/documentManagement/types"/>
+    <ds:schemaRef ds:uri="http://schemas.microsoft.com/office/infopath/2007/PartnerControls"/>
+    <ds:schemaRef ds:uri="http://schemas.openxmlformats.org/package/2006/metadata/core-properties"/>
+    <ds:schemaRef ds:uri="http://purl.org/dc/elements/1.1/"/>
+    <ds:schemaRef ds:uri="http://purl.org/dc/terms/"/>
+    <ds:schemaRef ds:uri="http://schemas.microsoft.com/internal/obd"/>
   </ds:schemaRefs>
 </ds:datastoreItem>
 </file>
@@ -11054,20 +11022,9 @@
 </file>
 
 <file path=customXml/itemProps3.xml><?xml version="1.0" encoding="utf-8"?>
-<ds:datastoreItem xmlns:ds="http://schemas.openxmlformats.org/officeDocument/2006/customXml" ds:itemID="{3CC849A4-28EB-4E35-A7B8-38E46F20B270}">
+<ds:datastoreItem xmlns:ds="http://schemas.openxmlformats.org/officeDocument/2006/customXml" ds:itemID="{D8BAE018-56F6-459D-83A1-5E0ED2D20635}">
   <ds:schemaRefs>
-    <ds:schemaRef ds:uri="http://schemas.microsoft.com/office/2006/metadata/contentType"/>
-    <ds:schemaRef ds:uri="http://schemas.microsoft.com/office/2006/metadata/properties/metaAttributes"/>
-    <ds:schemaRef ds:uri="http://www.w3.org/2001/XMLSchema"/>
-    <ds:schemaRef ds:uri="http://schemas.microsoft.com/office/2006/metadata/properties"/>
-    <ds:schemaRef ds:uri="68529c53-d4f5-4c89-b7df-303d2cf410e4"/>
-    <ds:schemaRef ds:uri="44fe81b0-5cc4-4eff-9771-d6fb78b117b2"/>
-    <ds:schemaRef ds:uri="http://schemas.microsoft.com/office/2006/documentManagement/types"/>
-    <ds:schemaRef ds:uri="http://schemas.microsoft.com/office/infopath/2007/PartnerControls"/>
-    <ds:schemaRef ds:uri="http://schemas.openxmlformats.org/package/2006/metadata/core-properties"/>
-    <ds:schemaRef ds:uri="http://purl.org/dc/elements/1.1/"/>
-    <ds:schemaRef ds:uri="http://purl.org/dc/terms/"/>
-    <ds:schemaRef ds:uri="http://schemas.microsoft.com/internal/obd"/>
+    <ds:schemaRef ds:uri="http://schemas.microsoft.com/sharepoint/v3/contenttype/forms"/>
   </ds:schemaRefs>
 </ds:datastoreItem>
 </file>

</xml_diff>